<commit_message>
Rpc call graph added
</commit_message>
<xml_diff>
--- a/doc/call graphs.pptx
+++ b/doc/call graphs.pptx
@@ -3534,14 +3534,14 @@
       </p:grpSpPr>
       <p:sp>
         <p:nvSpPr>
-          <p:cNvPr id="4" name="Rettangolo 3"/>
+          <p:cNvPr id="11" name="Rettangolo 10"/>
           <p:cNvSpPr/>
           <p:nvPr/>
         </p:nvSpPr>
         <p:spPr>
           <a:xfrm>
-            <a:off x="1282296" y="2421979"/>
-            <a:ext cx="1514332" cy="329696"/>
+            <a:off x="415727" y="3978562"/>
+            <a:ext cx="1917340" cy="329696"/>
           </a:xfrm>
           <a:prstGeom prst="rect">
             <a:avLst/>
@@ -3578,7 +3578,7 @@
                   <a:schemeClr val="tx1"/>
                 </a:solidFill>
               </a:rPr>
-              <a:t>trie.Lookup</a:t>
+              <a:t>callId.Increment</a:t>
             </a:r>
             <a:r>
               <a:rPr lang="it-IT" dirty="0" smtClean="0">
@@ -3598,14 +3598,14 @@
       </p:sp>
       <p:sp>
         <p:nvSpPr>
-          <p:cNvPr id="14" name="Rettangolo 13"/>
+          <p:cNvPr id="12" name="Rettangolo 11"/>
           <p:cNvSpPr/>
           <p:nvPr/>
         </p:nvSpPr>
         <p:spPr>
           <a:xfrm>
-            <a:off x="1282296" y="4106621"/>
-            <a:ext cx="1514331" cy="329696"/>
+            <a:off x="5859131" y="266501"/>
+            <a:ext cx="1532904" cy="329696"/>
           </a:xfrm>
           <a:prstGeom prst="rect">
             <a:avLst/>
@@ -3642,7 +3642,7 @@
                   <a:schemeClr val="tx1"/>
                 </a:solidFill>
               </a:rPr>
-              <a:t>trie.prefix</a:t>
+              <a:t>NewClient</a:t>
             </a:r>
             <a:r>
               <a:rPr lang="it-IT" dirty="0" smtClean="0">
@@ -3660,19 +3660,211 @@
           </a:p>
         </p:txBody>
       </p:sp>
+      <p:sp>
+        <p:nvSpPr>
+          <p:cNvPr id="13" name="Rettangolo 12"/>
+          <p:cNvSpPr/>
+          <p:nvPr/>
+        </p:nvSpPr>
+        <p:spPr>
+          <a:xfrm>
+            <a:off x="1141851" y="266501"/>
+            <a:ext cx="1551477" cy="329696"/>
+          </a:xfrm>
+          <a:prstGeom prst="rect">
+            <a:avLst/>
+          </a:prstGeom>
+          <a:noFill/>
+          <a:ln>
+            <a:solidFill>
+              <a:schemeClr val="tx1"/>
+            </a:solidFill>
+          </a:ln>
+        </p:spPr>
+        <p:style>
+          <a:lnRef idx="1">
+            <a:schemeClr val="accent1"/>
+          </a:lnRef>
+          <a:fillRef idx="3">
+            <a:schemeClr val="accent1"/>
+          </a:fillRef>
+          <a:effectRef idx="2">
+            <a:schemeClr val="accent1"/>
+          </a:effectRef>
+          <a:fontRef idx="minor">
+            <a:schemeClr val="lt1"/>
+          </a:fontRef>
+        </p:style>
+        <p:txBody>
+          <a:bodyPr rtlCol="0" anchor="ctr"/>
+          <a:lstStyle/>
+          <a:p>
+            <a:pPr algn="ctr"/>
+            <a:r>
+              <a:rPr lang="it-IT" dirty="0" err="1" smtClean="0">
+                <a:solidFill>
+                  <a:schemeClr val="tx1"/>
+                </a:solidFill>
+              </a:rPr>
+              <a:t>NewServer</a:t>
+            </a:r>
+            <a:r>
+              <a:rPr lang="it-IT" dirty="0" smtClean="0">
+                <a:solidFill>
+                  <a:schemeClr val="tx1"/>
+                </a:solidFill>
+              </a:rPr>
+              <a:t>()</a:t>
+            </a:r>
+            <a:endParaRPr lang="it-IT" dirty="0">
+              <a:solidFill>
+                <a:schemeClr val="tx1"/>
+              </a:solidFill>
+            </a:endParaRPr>
+          </a:p>
+        </p:txBody>
+      </p:sp>
+      <p:sp>
+        <p:nvSpPr>
+          <p:cNvPr id="15" name="Rettangolo 14"/>
+          <p:cNvSpPr/>
+          <p:nvPr/>
+        </p:nvSpPr>
+        <p:spPr>
+          <a:xfrm>
+            <a:off x="5755072" y="2257128"/>
+            <a:ext cx="1917340" cy="329696"/>
+          </a:xfrm>
+          <a:prstGeom prst="rect">
+            <a:avLst/>
+          </a:prstGeom>
+          <a:noFill/>
+          <a:ln>
+            <a:solidFill>
+              <a:schemeClr val="tx1"/>
+            </a:solidFill>
+          </a:ln>
+        </p:spPr>
+        <p:style>
+          <a:lnRef idx="1">
+            <a:schemeClr val="accent1"/>
+          </a:lnRef>
+          <a:fillRef idx="3">
+            <a:schemeClr val="accent1"/>
+          </a:fillRef>
+          <a:effectRef idx="2">
+            <a:schemeClr val="accent1"/>
+          </a:effectRef>
+          <a:fontRef idx="minor">
+            <a:schemeClr val="lt1"/>
+          </a:fontRef>
+        </p:style>
+        <p:txBody>
+          <a:bodyPr rtlCol="0" anchor="ctr"/>
+          <a:lstStyle/>
+          <a:p>
+            <a:pPr algn="ctr"/>
+            <a:r>
+              <a:rPr lang="it-IT" dirty="0" err="1" smtClean="0">
+                <a:solidFill>
+                  <a:schemeClr val="tx1"/>
+                </a:solidFill>
+              </a:rPr>
+              <a:t>Client.Dispatch</a:t>
+            </a:r>
+            <a:r>
+              <a:rPr lang="it-IT" dirty="0" smtClean="0">
+                <a:solidFill>
+                  <a:schemeClr val="tx1"/>
+                </a:solidFill>
+              </a:rPr>
+              <a:t>()</a:t>
+            </a:r>
+            <a:endParaRPr lang="it-IT" dirty="0">
+              <a:solidFill>
+                <a:schemeClr val="tx1"/>
+              </a:solidFill>
+            </a:endParaRPr>
+          </a:p>
+        </p:txBody>
+      </p:sp>
+      <p:sp>
+        <p:nvSpPr>
+          <p:cNvPr id="17" name="Rettangolo 16"/>
+          <p:cNvSpPr/>
+          <p:nvPr/>
+        </p:nvSpPr>
+        <p:spPr>
+          <a:xfrm>
+            <a:off x="5764232" y="3978562"/>
+            <a:ext cx="1917340" cy="329696"/>
+          </a:xfrm>
+          <a:prstGeom prst="rect">
+            <a:avLst/>
+          </a:prstGeom>
+          <a:noFill/>
+          <a:ln>
+            <a:solidFill>
+              <a:schemeClr val="tx1"/>
+            </a:solidFill>
+          </a:ln>
+        </p:spPr>
+        <p:style>
+          <a:lnRef idx="1">
+            <a:schemeClr val="accent1"/>
+          </a:lnRef>
+          <a:fillRef idx="3">
+            <a:schemeClr val="accent1"/>
+          </a:fillRef>
+          <a:effectRef idx="2">
+            <a:schemeClr val="accent1"/>
+          </a:effectRef>
+          <a:fontRef idx="minor">
+            <a:schemeClr val="lt1"/>
+          </a:fontRef>
+        </p:style>
+        <p:txBody>
+          <a:bodyPr rtlCol="0" anchor="ctr"/>
+          <a:lstStyle/>
+          <a:p>
+            <a:pPr algn="ctr"/>
+            <a:r>
+              <a:rPr lang="it-IT" dirty="0" err="1" smtClean="0">
+                <a:solidFill>
+                  <a:schemeClr val="tx1"/>
+                </a:solidFill>
+              </a:rPr>
+              <a:t>Decoder.Decode</a:t>
+            </a:r>
+            <a:r>
+              <a:rPr lang="it-IT" dirty="0" smtClean="0">
+                <a:solidFill>
+                  <a:schemeClr val="tx1"/>
+                </a:solidFill>
+              </a:rPr>
+              <a:t>()</a:t>
+            </a:r>
+            <a:endParaRPr lang="it-IT" dirty="0">
+              <a:solidFill>
+                <a:schemeClr val="tx1"/>
+              </a:solidFill>
+            </a:endParaRPr>
+          </a:p>
+        </p:txBody>
+      </p:sp>
       <p:cxnSp>
         <p:nvCxnSpPr>
-          <p:cNvPr id="16" name="Connettore 2 15"/>
+          <p:cNvPr id="18" name="Connettore 2 17"/>
           <p:cNvCxnSpPr>
-            <a:stCxn id="4" idx="2"/>
-            <a:endCxn id="14" idx="0"/>
+            <a:stCxn id="15" idx="2"/>
+            <a:endCxn id="17" idx="0"/>
           </p:cNvCxnSpPr>
           <p:nvPr/>
         </p:nvCxnSpPr>
         <p:spPr>
           <a:xfrm>
-            <a:off x="2039462" y="2751675"/>
-            <a:ext cx="0" cy="1354946"/>
+            <a:off x="6713742" y="2586824"/>
+            <a:ext cx="9160" cy="1391738"/>
           </a:xfrm>
           <a:prstGeom prst="straightConnector1">
             <a:avLst/>
@@ -3701,14 +3893,14 @@
       </p:cxnSp>
       <p:sp>
         <p:nvSpPr>
-          <p:cNvPr id="19" name="Rettangolo 18"/>
+          <p:cNvPr id="21" name="Rettangolo 20"/>
           <p:cNvSpPr/>
           <p:nvPr/>
         </p:nvSpPr>
         <p:spPr>
           <a:xfrm>
-            <a:off x="6368488" y="2429037"/>
-            <a:ext cx="1514332" cy="329696"/>
+            <a:off x="1535957" y="2217484"/>
+            <a:ext cx="1917340" cy="329696"/>
           </a:xfrm>
           <a:prstGeom prst="rect">
             <a:avLst/>
@@ -3745,7 +3937,7 @@
                   <a:schemeClr val="tx1"/>
                 </a:solidFill>
               </a:rPr>
-              <a:t>trie.Delete</a:t>
+              <a:t>Client.Go</a:t>
             </a:r>
             <a:r>
               <a:rPr lang="it-IT" dirty="0" smtClean="0">
@@ -3763,16 +3955,55 @@
           </a:p>
         </p:txBody>
       </p:sp>
-      <p:sp>
-        <p:nvSpPr>
-          <p:cNvPr id="22" name="Rettangolo 21"/>
+      <p:cxnSp>
+        <p:nvCxnSpPr>
+          <p:cNvPr id="25" name="Connettore 2 24"/>
+          <p:cNvCxnSpPr>
+            <a:stCxn id="21" idx="2"/>
+            <a:endCxn id="11" idx="0"/>
+          </p:cNvCxnSpPr>
+          <p:nvPr/>
+        </p:nvCxnSpPr>
+        <p:spPr>
+          <a:xfrm flipH="1">
+            <a:off x="1374397" y="2547180"/>
+            <a:ext cx="1120230" cy="1431382"/>
+          </a:xfrm>
+          <a:prstGeom prst="straightConnector1">
+            <a:avLst/>
+          </a:prstGeom>
+          <a:ln w="19050">
+            <a:solidFill>
+              <a:srgbClr val="000000"/>
+            </a:solidFill>
+            <a:tailEnd type="triangle" w="lg" len="lg"/>
+          </a:ln>
+        </p:spPr>
+        <p:style>
+          <a:lnRef idx="2">
+            <a:schemeClr val="accent1"/>
+          </a:lnRef>
+          <a:fillRef idx="0">
+            <a:schemeClr val="accent1"/>
+          </a:fillRef>
+          <a:effectRef idx="1">
+            <a:schemeClr val="accent1"/>
+          </a:effectRef>
+          <a:fontRef idx="minor">
+            <a:schemeClr val="tx1"/>
+          </a:fontRef>
+        </p:style>
+      </p:cxnSp>
+      <p:sp>
+        <p:nvSpPr>
+          <p:cNvPr id="26" name="Rettangolo 25"/>
           <p:cNvSpPr/>
           <p:nvPr/>
         </p:nvSpPr>
         <p:spPr>
           <a:xfrm>
-            <a:off x="3809746" y="2429037"/>
-            <a:ext cx="1514332" cy="329696"/>
+            <a:off x="2784924" y="3978562"/>
+            <a:ext cx="1917340" cy="329696"/>
           </a:xfrm>
           <a:prstGeom prst="rect">
             <a:avLst/>
@@ -3804,20 +4035,12 @@
           <a:p>
             <a:pPr algn="ctr"/>
             <a:r>
-              <a:rPr lang="it-IT" dirty="0" err="1">
+              <a:rPr lang="it-IT" dirty="0" err="1" smtClean="0">
                 <a:solidFill>
                   <a:schemeClr val="tx1"/>
                 </a:solidFill>
               </a:rPr>
-              <a:t>t</a:t>
-            </a:r>
-            <a:r>
-              <a:rPr lang="it-IT" dirty="0" err="1" smtClean="0">
-                <a:solidFill>
-                  <a:schemeClr val="tx1"/>
-                </a:solidFill>
-              </a:rPr>
-              <a:t>rie.Insert</a:t>
+              <a:t>Encoder.Encode</a:t>
             </a:r>
             <a:r>
               <a:rPr lang="it-IT" dirty="0" smtClean="0">
@@ -3835,16 +4058,55 @@
           </a:p>
         </p:txBody>
       </p:sp>
-      <p:sp>
-        <p:nvSpPr>
-          <p:cNvPr id="23" name="Rettangolo 22"/>
+      <p:cxnSp>
+        <p:nvCxnSpPr>
+          <p:cNvPr id="27" name="Connettore 2 26"/>
+          <p:cNvCxnSpPr>
+            <a:stCxn id="21" idx="2"/>
+            <a:endCxn id="26" idx="0"/>
+          </p:cNvCxnSpPr>
+          <p:nvPr/>
+        </p:nvCxnSpPr>
+        <p:spPr>
+          <a:xfrm>
+            <a:off x="2494627" y="2547180"/>
+            <a:ext cx="1248967" cy="1431382"/>
+          </a:xfrm>
+          <a:prstGeom prst="straightConnector1">
+            <a:avLst/>
+          </a:prstGeom>
+          <a:ln w="19050">
+            <a:solidFill>
+              <a:srgbClr val="000000"/>
+            </a:solidFill>
+            <a:tailEnd type="triangle" w="lg" len="lg"/>
+          </a:ln>
+        </p:spPr>
+        <p:style>
+          <a:lnRef idx="2">
+            <a:schemeClr val="accent1"/>
+          </a:lnRef>
+          <a:fillRef idx="0">
+            <a:schemeClr val="accent1"/>
+          </a:fillRef>
+          <a:effectRef idx="1">
+            <a:schemeClr val="accent1"/>
+          </a:effectRef>
+          <a:fontRef idx="minor">
+            <a:schemeClr val="tx1"/>
+          </a:fontRef>
+        </p:style>
+      </p:cxnSp>
+      <p:sp>
+        <p:nvSpPr>
+          <p:cNvPr id="29" name="Rettangolo 28"/>
           <p:cNvSpPr/>
           <p:nvPr/>
         </p:nvSpPr>
         <p:spPr>
           <a:xfrm>
-            <a:off x="3809746" y="4113679"/>
-            <a:ext cx="1514331" cy="329696"/>
+            <a:off x="3498837" y="862699"/>
+            <a:ext cx="1917340" cy="329696"/>
           </a:xfrm>
           <a:prstGeom prst="rect">
             <a:avLst/>
@@ -3881,7 +4143,7 @@
                   <a:schemeClr val="tx1"/>
                 </a:solidFill>
               </a:rPr>
-              <a:t>trie.prefix</a:t>
+              <a:t>Client.Call</a:t>
             </a:r>
             <a:r>
               <a:rPr lang="it-IT" dirty="0" smtClean="0">
@@ -3901,17 +4163,429 @@
       </p:sp>
       <p:cxnSp>
         <p:nvCxnSpPr>
-          <p:cNvPr id="24" name="Connettore 2 23"/>
+          <p:cNvPr id="30" name="Connettore 2 29"/>
           <p:cNvCxnSpPr>
-            <a:stCxn id="22" idx="2"/>
-            <a:endCxn id="23" idx="0"/>
+            <a:stCxn id="29" idx="2"/>
+            <a:endCxn id="21" idx="0"/>
+          </p:cNvCxnSpPr>
+          <p:nvPr/>
+        </p:nvCxnSpPr>
+        <p:spPr>
+          <a:xfrm flipH="1">
+            <a:off x="2494627" y="1192395"/>
+            <a:ext cx="1962880" cy="1025089"/>
+          </a:xfrm>
+          <a:prstGeom prst="straightConnector1">
+            <a:avLst/>
+          </a:prstGeom>
+          <a:ln w="19050">
+            <a:solidFill>
+              <a:srgbClr val="000000"/>
+            </a:solidFill>
+            <a:tailEnd type="triangle" w="lg" len="lg"/>
+          </a:ln>
+        </p:spPr>
+        <p:style>
+          <a:lnRef idx="2">
+            <a:schemeClr val="accent1"/>
+          </a:lnRef>
+          <a:fillRef idx="0">
+            <a:schemeClr val="accent1"/>
+          </a:fillRef>
+          <a:effectRef idx="1">
+            <a:schemeClr val="accent1"/>
+          </a:effectRef>
+          <a:fontRef idx="minor">
+            <a:schemeClr val="tx1"/>
+          </a:fontRef>
+        </p:style>
+      </p:cxnSp>
+      <p:cxnSp>
+        <p:nvCxnSpPr>
+          <p:cNvPr id="33" name="Connettore 2 32"/>
+          <p:cNvCxnSpPr>
+            <a:stCxn id="29" idx="2"/>
+            <a:endCxn id="15" idx="0"/>
           </p:cNvCxnSpPr>
           <p:nvPr/>
         </p:nvCxnSpPr>
         <p:spPr>
           <a:xfrm>
-            <a:off x="4566912" y="2758733"/>
-            <a:ext cx="0" cy="1354946"/>
+            <a:off x="4457507" y="1192395"/>
+            <a:ext cx="2256235" cy="1064733"/>
+          </a:xfrm>
+          <a:prstGeom prst="straightConnector1">
+            <a:avLst/>
+          </a:prstGeom>
+          <a:ln w="19050">
+            <a:solidFill>
+              <a:srgbClr val="000000"/>
+            </a:solidFill>
+            <a:tailEnd type="triangle" w="lg" len="lg"/>
+          </a:ln>
+        </p:spPr>
+        <p:style>
+          <a:lnRef idx="2">
+            <a:schemeClr val="accent1"/>
+          </a:lnRef>
+          <a:fillRef idx="0">
+            <a:schemeClr val="accent1"/>
+          </a:fillRef>
+          <a:effectRef idx="1">
+            <a:schemeClr val="accent1"/>
+          </a:effectRef>
+          <a:fontRef idx="minor">
+            <a:schemeClr val="tx1"/>
+          </a:fontRef>
+        </p:style>
+      </p:cxnSp>
+      <p:sp>
+        <p:nvSpPr>
+          <p:cNvPr id="60" name="Rettangolo 59"/>
+          <p:cNvSpPr/>
+          <p:nvPr/>
+        </p:nvSpPr>
+        <p:spPr>
+          <a:xfrm>
+            <a:off x="3743084" y="4790437"/>
+            <a:ext cx="1673093" cy="329696"/>
+          </a:xfrm>
+          <a:prstGeom prst="rect">
+            <a:avLst/>
+          </a:prstGeom>
+          <a:noFill/>
+          <a:ln>
+            <a:solidFill>
+              <a:schemeClr val="tx1"/>
+            </a:solidFill>
+          </a:ln>
+        </p:spPr>
+        <p:style>
+          <a:lnRef idx="1">
+            <a:schemeClr val="accent1"/>
+          </a:lnRef>
+          <a:fillRef idx="3">
+            <a:schemeClr val="accent1"/>
+          </a:fillRef>
+          <a:effectRef idx="2">
+            <a:schemeClr val="accent1"/>
+          </a:effectRef>
+          <a:fontRef idx="minor">
+            <a:schemeClr val="lt1"/>
+          </a:fontRef>
+        </p:style>
+        <p:txBody>
+          <a:bodyPr rtlCol="0" anchor="ctr"/>
+          <a:lstStyle/>
+          <a:p>
+            <a:pPr algn="ctr"/>
+            <a:r>
+              <a:rPr lang="it-IT" dirty="0" err="1" smtClean="0">
+                <a:solidFill>
+                  <a:schemeClr val="tx1"/>
+                </a:solidFill>
+              </a:rPr>
+              <a:t>Server.Handle</a:t>
+            </a:r>
+            <a:r>
+              <a:rPr lang="it-IT" dirty="0" smtClean="0">
+                <a:solidFill>
+                  <a:schemeClr val="tx1"/>
+                </a:solidFill>
+              </a:rPr>
+              <a:t>()</a:t>
+            </a:r>
+            <a:endParaRPr lang="it-IT" dirty="0">
+              <a:solidFill>
+                <a:schemeClr val="tx1"/>
+              </a:solidFill>
+            </a:endParaRPr>
+          </a:p>
+        </p:txBody>
+      </p:sp>
+      <p:sp>
+        <p:nvSpPr>
+          <p:cNvPr id="61" name="Rettangolo 60"/>
+          <p:cNvSpPr/>
+          <p:nvPr/>
+        </p:nvSpPr>
+        <p:spPr>
+          <a:xfrm>
+            <a:off x="6600523" y="5942784"/>
+            <a:ext cx="1917340" cy="329696"/>
+          </a:xfrm>
+          <a:prstGeom prst="rect">
+            <a:avLst/>
+          </a:prstGeom>
+          <a:noFill/>
+          <a:ln>
+            <a:solidFill>
+              <a:schemeClr val="tx1"/>
+            </a:solidFill>
+          </a:ln>
+        </p:spPr>
+        <p:style>
+          <a:lnRef idx="1">
+            <a:schemeClr val="accent1"/>
+          </a:lnRef>
+          <a:fillRef idx="3">
+            <a:schemeClr val="accent1"/>
+          </a:fillRef>
+          <a:effectRef idx="2">
+            <a:schemeClr val="accent1"/>
+          </a:effectRef>
+          <a:fontRef idx="minor">
+            <a:schemeClr val="lt1"/>
+          </a:fontRef>
+        </p:style>
+        <p:txBody>
+          <a:bodyPr rtlCol="0" anchor="ctr"/>
+          <a:lstStyle/>
+          <a:p>
+            <a:pPr algn="ctr"/>
+            <a:r>
+              <a:rPr lang="it-IT" dirty="0" err="1" smtClean="0">
+                <a:solidFill>
+                  <a:schemeClr val="tx1"/>
+                </a:solidFill>
+              </a:rPr>
+              <a:t>Decoder.Decode</a:t>
+            </a:r>
+            <a:r>
+              <a:rPr lang="it-IT" dirty="0" smtClean="0">
+                <a:solidFill>
+                  <a:schemeClr val="tx1"/>
+                </a:solidFill>
+              </a:rPr>
+              <a:t>()</a:t>
+            </a:r>
+            <a:endParaRPr lang="it-IT" dirty="0">
+              <a:solidFill>
+                <a:schemeClr val="tx1"/>
+              </a:solidFill>
+            </a:endParaRPr>
+          </a:p>
+        </p:txBody>
+      </p:sp>
+      <p:sp>
+        <p:nvSpPr>
+          <p:cNvPr id="62" name="Rettangolo 61"/>
+          <p:cNvSpPr/>
+          <p:nvPr/>
+        </p:nvSpPr>
+        <p:spPr>
+          <a:xfrm>
+            <a:off x="3336773" y="5931522"/>
+            <a:ext cx="2497934" cy="329696"/>
+          </a:xfrm>
+          <a:prstGeom prst="rect">
+            <a:avLst/>
+          </a:prstGeom>
+          <a:noFill/>
+          <a:ln>
+            <a:solidFill>
+              <a:schemeClr val="tx1"/>
+            </a:solidFill>
+          </a:ln>
+        </p:spPr>
+        <p:style>
+          <a:lnRef idx="1">
+            <a:schemeClr val="accent1"/>
+          </a:lnRef>
+          <a:fillRef idx="3">
+            <a:schemeClr val="accent1"/>
+          </a:fillRef>
+          <a:effectRef idx="2">
+            <a:schemeClr val="accent1"/>
+          </a:effectRef>
+          <a:fontRef idx="minor">
+            <a:schemeClr val="lt1"/>
+          </a:fontRef>
+        </p:style>
+        <p:txBody>
+          <a:bodyPr rtlCol="0" anchor="ctr"/>
+          <a:lstStyle/>
+          <a:p>
+            <a:pPr algn="ctr"/>
+            <a:r>
+              <a:rPr lang="it-IT" dirty="0" err="1" smtClean="0">
+                <a:solidFill>
+                  <a:schemeClr val="tx1"/>
+                </a:solidFill>
+              </a:rPr>
+              <a:t>Decoder.DecodeValue</a:t>
+            </a:r>
+            <a:r>
+              <a:rPr lang="it-IT" dirty="0" smtClean="0">
+                <a:solidFill>
+                  <a:schemeClr val="tx1"/>
+                </a:solidFill>
+              </a:rPr>
+              <a:t>()</a:t>
+            </a:r>
+            <a:endParaRPr lang="it-IT" dirty="0">
+              <a:solidFill>
+                <a:schemeClr val="tx1"/>
+              </a:solidFill>
+            </a:endParaRPr>
+          </a:p>
+        </p:txBody>
+      </p:sp>
+      <p:sp>
+        <p:nvSpPr>
+          <p:cNvPr id="63" name="Rettangolo 62"/>
+          <p:cNvSpPr/>
+          <p:nvPr/>
+        </p:nvSpPr>
+        <p:spPr>
+          <a:xfrm>
+            <a:off x="286990" y="5942784"/>
+            <a:ext cx="2497934" cy="329696"/>
+          </a:xfrm>
+          <a:prstGeom prst="rect">
+            <a:avLst/>
+          </a:prstGeom>
+          <a:noFill/>
+          <a:ln>
+            <a:solidFill>
+              <a:schemeClr val="tx1"/>
+            </a:solidFill>
+          </a:ln>
+        </p:spPr>
+        <p:style>
+          <a:lnRef idx="1">
+            <a:schemeClr val="accent1"/>
+          </a:lnRef>
+          <a:fillRef idx="3">
+            <a:schemeClr val="accent1"/>
+          </a:fillRef>
+          <a:effectRef idx="2">
+            <a:schemeClr val="accent1"/>
+          </a:effectRef>
+          <a:fontRef idx="minor">
+            <a:schemeClr val="lt1"/>
+          </a:fontRef>
+        </p:style>
+        <p:txBody>
+          <a:bodyPr rtlCol="0" anchor="ctr"/>
+          <a:lstStyle/>
+          <a:p>
+            <a:pPr algn="ctr"/>
+            <a:r>
+              <a:rPr lang="it-IT" dirty="0" err="1" smtClean="0">
+                <a:solidFill>
+                  <a:schemeClr val="tx1"/>
+                </a:solidFill>
+              </a:rPr>
+              <a:t>Encoder.EncodeValue</a:t>
+            </a:r>
+            <a:r>
+              <a:rPr lang="it-IT" dirty="0" smtClean="0">
+                <a:solidFill>
+                  <a:schemeClr val="tx1"/>
+                </a:solidFill>
+              </a:rPr>
+              <a:t>()</a:t>
+            </a:r>
+            <a:endParaRPr lang="it-IT" dirty="0">
+              <a:solidFill>
+                <a:schemeClr val="tx1"/>
+              </a:solidFill>
+            </a:endParaRPr>
+          </a:p>
+        </p:txBody>
+      </p:sp>
+      <p:cxnSp>
+        <p:nvCxnSpPr>
+          <p:cNvPr id="64" name="Connettore 2 63"/>
+          <p:cNvCxnSpPr>
+            <a:stCxn id="60" idx="2"/>
+            <a:endCxn id="62" idx="0"/>
+          </p:cNvCxnSpPr>
+          <p:nvPr/>
+        </p:nvCxnSpPr>
+        <p:spPr>
+          <a:xfrm>
+            <a:off x="4579631" y="5120133"/>
+            <a:ext cx="6109" cy="811389"/>
+          </a:xfrm>
+          <a:prstGeom prst="straightConnector1">
+            <a:avLst/>
+          </a:prstGeom>
+          <a:ln w="19050">
+            <a:solidFill>
+              <a:srgbClr val="000000"/>
+            </a:solidFill>
+            <a:tailEnd type="triangle" w="lg" len="lg"/>
+          </a:ln>
+        </p:spPr>
+        <p:style>
+          <a:lnRef idx="2">
+            <a:schemeClr val="accent1"/>
+          </a:lnRef>
+          <a:fillRef idx="0">
+            <a:schemeClr val="accent1"/>
+          </a:fillRef>
+          <a:effectRef idx="1">
+            <a:schemeClr val="accent1"/>
+          </a:effectRef>
+          <a:fontRef idx="minor">
+            <a:schemeClr val="tx1"/>
+          </a:fontRef>
+        </p:style>
+      </p:cxnSp>
+      <p:cxnSp>
+        <p:nvCxnSpPr>
+          <p:cNvPr id="67" name="Connettore 2 66"/>
+          <p:cNvCxnSpPr>
+            <a:stCxn id="60" idx="2"/>
+            <a:endCxn id="61" idx="0"/>
+          </p:cNvCxnSpPr>
+          <p:nvPr/>
+        </p:nvCxnSpPr>
+        <p:spPr>
+          <a:xfrm>
+            <a:off x="4579631" y="5120133"/>
+            <a:ext cx="2979562" cy="822651"/>
+          </a:xfrm>
+          <a:prstGeom prst="straightConnector1">
+            <a:avLst/>
+          </a:prstGeom>
+          <a:ln w="19050">
+            <a:solidFill>
+              <a:srgbClr val="000000"/>
+            </a:solidFill>
+            <a:tailEnd type="triangle" w="lg" len="lg"/>
+          </a:ln>
+        </p:spPr>
+        <p:style>
+          <a:lnRef idx="2">
+            <a:schemeClr val="accent1"/>
+          </a:lnRef>
+          <a:fillRef idx="0">
+            <a:schemeClr val="accent1"/>
+          </a:fillRef>
+          <a:effectRef idx="1">
+            <a:schemeClr val="accent1"/>
+          </a:effectRef>
+          <a:fontRef idx="minor">
+            <a:schemeClr val="tx1"/>
+          </a:fontRef>
+        </p:style>
+      </p:cxnSp>
+      <p:cxnSp>
+        <p:nvCxnSpPr>
+          <p:cNvPr id="70" name="Connettore 2 69"/>
+          <p:cNvCxnSpPr>
+            <a:stCxn id="60" idx="2"/>
+            <a:endCxn id="63" idx="0"/>
+          </p:cNvCxnSpPr>
+          <p:nvPr/>
+        </p:nvCxnSpPr>
+        <p:spPr>
+          <a:xfrm flipH="1">
+            <a:off x="1535957" y="5120133"/>
+            <a:ext cx="3043674" cy="822651"/>
           </a:xfrm>
           <a:prstGeom prst="straightConnector1">
             <a:avLst/>

</xml_diff>

<commit_message>
tt call graph added
</commit_message>
<xml_diff>
--- a/doc/call graphs.pptx
+++ b/doc/call graphs.pptx
@@ -7,6 +7,8 @@
   <p:sldIdLst>
     <p:sldId id="256" r:id="rId2"/>
     <p:sldId id="257" r:id="rId3"/>
+    <p:sldId id="259" r:id="rId4"/>
+    <p:sldId id="258" r:id="rId5"/>
   </p:sldIdLst>
   <p:sldSz cx="9144000" cy="6858000" type="screen4x3"/>
   <p:notesSz cx="6858000" cy="9144000"/>
@@ -4616,6 +4618,1616 @@
     <p:extLst>
       <p:ext uri="{BB962C8B-B14F-4D97-AF65-F5344CB8AC3E}">
         <p14:creationId xmlns:p14="http://schemas.microsoft.com/office/powerpoint/2010/main" val="1027109171"/>
+      </p:ext>
+    </p:extLst>
+  </p:cSld>
+  <p:clrMapOvr>
+    <a:masterClrMapping/>
+  </p:clrMapOvr>
+</p:sld>
+</file>
+
+<file path=ppt/slides/slide3.xml><?xml version="1.0" encoding="utf-8"?>
+<p:sld xmlns:a="http://schemas.openxmlformats.org/drawingml/2006/main" xmlns:r="http://schemas.openxmlformats.org/officeDocument/2006/relationships" xmlns:p="http://schemas.openxmlformats.org/presentationml/2006/main">
+  <p:cSld>
+    <p:spTree>
+      <p:nvGrpSpPr>
+        <p:cNvPr id="1" name=""/>
+        <p:cNvGrpSpPr/>
+        <p:nvPr/>
+      </p:nvGrpSpPr>
+      <p:grpSpPr>
+        <a:xfrm>
+          <a:off x="0" y="0"/>
+          <a:ext cx="0" cy="0"/>
+          <a:chOff x="0" y="0"/>
+          <a:chExt cx="0" cy="0"/>
+        </a:xfrm>
+      </p:grpSpPr>
+      <p:sp>
+        <p:nvSpPr>
+          <p:cNvPr id="4" name="Rettangolo 3"/>
+          <p:cNvSpPr/>
+          <p:nvPr/>
+        </p:nvSpPr>
+        <p:spPr>
+          <a:xfrm>
+            <a:off x="1569287" y="3068447"/>
+            <a:ext cx="2637869" cy="329696"/>
+          </a:xfrm>
+          <a:prstGeom prst="rect">
+            <a:avLst/>
+          </a:prstGeom>
+          <a:noFill/>
+          <a:ln>
+            <a:solidFill>
+              <a:schemeClr val="tx1"/>
+            </a:solidFill>
+          </a:ln>
+        </p:spPr>
+        <p:style>
+          <a:lnRef idx="1">
+            <a:schemeClr val="accent1"/>
+          </a:lnRef>
+          <a:fillRef idx="3">
+            <a:schemeClr val="accent1"/>
+          </a:fillRef>
+          <a:effectRef idx="2">
+            <a:schemeClr val="accent1"/>
+          </a:effectRef>
+          <a:fontRef idx="minor">
+            <a:schemeClr val="lt1"/>
+          </a:fontRef>
+        </p:style>
+        <p:txBody>
+          <a:bodyPr rtlCol="0" anchor="ctr"/>
+          <a:lstStyle/>
+          <a:p>
+            <a:pPr algn="ctr"/>
+            <a:r>
+              <a:rPr lang="it-IT" dirty="0" err="1" smtClean="0">
+                <a:solidFill>
+                  <a:schemeClr val="tx1"/>
+                </a:solidFill>
+              </a:rPr>
+              <a:t>typetable.TypeForHash</a:t>
+            </a:r>
+            <a:r>
+              <a:rPr lang="it-IT" dirty="0" smtClean="0">
+                <a:solidFill>
+                  <a:schemeClr val="tx1"/>
+                </a:solidFill>
+              </a:rPr>
+              <a:t>()</a:t>
+            </a:r>
+            <a:endParaRPr lang="it-IT" dirty="0">
+              <a:solidFill>
+                <a:schemeClr val="tx1"/>
+              </a:solidFill>
+            </a:endParaRPr>
+          </a:p>
+        </p:txBody>
+      </p:sp>
+      <p:sp>
+        <p:nvSpPr>
+          <p:cNvPr id="14" name="Rettangolo 13"/>
+          <p:cNvSpPr/>
+          <p:nvPr/>
+        </p:nvSpPr>
+        <p:spPr>
+          <a:xfrm>
+            <a:off x="2131056" y="4769027"/>
+            <a:ext cx="1514331" cy="329696"/>
+          </a:xfrm>
+          <a:prstGeom prst="rect">
+            <a:avLst/>
+          </a:prstGeom>
+          <a:noFill/>
+          <a:ln>
+            <a:solidFill>
+              <a:schemeClr val="tx1"/>
+            </a:solidFill>
+          </a:ln>
+        </p:spPr>
+        <p:style>
+          <a:lnRef idx="1">
+            <a:schemeClr val="accent1"/>
+          </a:lnRef>
+          <a:fillRef idx="3">
+            <a:schemeClr val="accent1"/>
+          </a:fillRef>
+          <a:effectRef idx="2">
+            <a:schemeClr val="accent1"/>
+          </a:effectRef>
+          <a:fontRef idx="minor">
+            <a:schemeClr val="lt1"/>
+          </a:fontRef>
+        </p:style>
+        <p:txBody>
+          <a:bodyPr rtlCol="0" anchor="ctr"/>
+          <a:lstStyle/>
+          <a:p>
+            <a:pPr algn="ctr"/>
+            <a:r>
+              <a:rPr lang="it-IT" dirty="0" err="1" smtClean="0">
+                <a:solidFill>
+                  <a:schemeClr val="tx1"/>
+                </a:solidFill>
+              </a:rPr>
+              <a:t>trie.Lookup</a:t>
+            </a:r>
+            <a:r>
+              <a:rPr lang="it-IT" dirty="0" smtClean="0">
+                <a:solidFill>
+                  <a:schemeClr val="tx1"/>
+                </a:solidFill>
+              </a:rPr>
+              <a:t>()</a:t>
+            </a:r>
+            <a:endParaRPr lang="it-IT" dirty="0">
+              <a:solidFill>
+                <a:schemeClr val="tx1"/>
+              </a:solidFill>
+            </a:endParaRPr>
+          </a:p>
+        </p:txBody>
+      </p:sp>
+      <p:cxnSp>
+        <p:nvCxnSpPr>
+          <p:cNvPr id="16" name="Connettore 2 15"/>
+          <p:cNvCxnSpPr>
+            <a:stCxn id="4" idx="2"/>
+            <a:endCxn id="14" idx="0"/>
+          </p:cNvCxnSpPr>
+          <p:nvPr/>
+        </p:nvCxnSpPr>
+        <p:spPr>
+          <a:xfrm>
+            <a:off x="2888222" y="3398143"/>
+            <a:ext cx="0" cy="1370884"/>
+          </a:xfrm>
+          <a:prstGeom prst="straightConnector1">
+            <a:avLst/>
+          </a:prstGeom>
+          <a:ln w="19050">
+            <a:solidFill>
+              <a:srgbClr val="000000"/>
+            </a:solidFill>
+            <a:tailEnd type="triangle" w="lg" len="lg"/>
+          </a:ln>
+        </p:spPr>
+        <p:style>
+          <a:lnRef idx="2">
+            <a:schemeClr val="accent1"/>
+          </a:lnRef>
+          <a:fillRef idx="0">
+            <a:schemeClr val="accent1"/>
+          </a:fillRef>
+          <a:effectRef idx="1">
+            <a:schemeClr val="accent1"/>
+          </a:effectRef>
+          <a:fontRef idx="minor">
+            <a:schemeClr val="tx1"/>
+          </a:fontRef>
+        </p:style>
+      </p:cxnSp>
+      <p:sp>
+        <p:nvSpPr>
+          <p:cNvPr id="19" name="Rettangolo 18"/>
+          <p:cNvSpPr/>
+          <p:nvPr/>
+        </p:nvSpPr>
+        <p:spPr>
+          <a:xfrm>
+            <a:off x="4869548" y="1560155"/>
+            <a:ext cx="2009187" cy="329696"/>
+          </a:xfrm>
+          <a:prstGeom prst="rect">
+            <a:avLst/>
+          </a:prstGeom>
+          <a:noFill/>
+          <a:ln>
+            <a:solidFill>
+              <a:schemeClr val="tx1"/>
+            </a:solidFill>
+          </a:ln>
+        </p:spPr>
+        <p:style>
+          <a:lnRef idx="1">
+            <a:schemeClr val="accent1"/>
+          </a:lnRef>
+          <a:fillRef idx="3">
+            <a:schemeClr val="accent1"/>
+          </a:fillRef>
+          <a:effectRef idx="2">
+            <a:schemeClr val="accent1"/>
+          </a:effectRef>
+          <a:fontRef idx="minor">
+            <a:schemeClr val="lt1"/>
+          </a:fontRef>
+        </p:style>
+        <p:txBody>
+          <a:bodyPr rtlCol="0" anchor="ctr"/>
+          <a:lstStyle/>
+          <a:p>
+            <a:pPr algn="ctr"/>
+            <a:r>
+              <a:rPr lang="it-IT" dirty="0" err="1" smtClean="0">
+                <a:solidFill>
+                  <a:schemeClr val="tx1"/>
+                </a:solidFill>
+              </a:rPr>
+              <a:t>newTypeTable</a:t>
+            </a:r>
+            <a:r>
+              <a:rPr lang="it-IT" dirty="0" smtClean="0">
+                <a:solidFill>
+                  <a:schemeClr val="tx1"/>
+                </a:solidFill>
+              </a:rPr>
+              <a:t>()</a:t>
+            </a:r>
+            <a:endParaRPr lang="it-IT" dirty="0">
+              <a:solidFill>
+                <a:schemeClr val="tx1"/>
+              </a:solidFill>
+            </a:endParaRPr>
+          </a:p>
+        </p:txBody>
+      </p:sp>
+      <p:sp>
+        <p:nvSpPr>
+          <p:cNvPr id="22" name="Rettangolo 21"/>
+          <p:cNvSpPr/>
+          <p:nvPr/>
+        </p:nvSpPr>
+        <p:spPr>
+          <a:xfrm>
+            <a:off x="4756711" y="3075505"/>
+            <a:ext cx="2234861" cy="329696"/>
+          </a:xfrm>
+          <a:prstGeom prst="rect">
+            <a:avLst/>
+          </a:prstGeom>
+          <a:noFill/>
+          <a:ln>
+            <a:solidFill>
+              <a:schemeClr val="tx1"/>
+            </a:solidFill>
+          </a:ln>
+        </p:spPr>
+        <p:style>
+          <a:lnRef idx="1">
+            <a:schemeClr val="accent1"/>
+          </a:lnRef>
+          <a:fillRef idx="3">
+            <a:schemeClr val="accent1"/>
+          </a:fillRef>
+          <a:effectRef idx="2">
+            <a:schemeClr val="accent1"/>
+          </a:effectRef>
+          <a:fontRef idx="minor">
+            <a:schemeClr val="lt1"/>
+          </a:fontRef>
+        </p:style>
+        <p:txBody>
+          <a:bodyPr rtlCol="0" anchor="ctr"/>
+          <a:lstStyle/>
+          <a:p>
+            <a:pPr algn="ctr"/>
+            <a:r>
+              <a:rPr lang="it-IT" dirty="0" err="1">
+                <a:solidFill>
+                  <a:schemeClr val="tx1"/>
+                </a:solidFill>
+              </a:rPr>
+              <a:t>t</a:t>
+            </a:r>
+            <a:r>
+              <a:rPr lang="it-IT" dirty="0" err="1" smtClean="0">
+                <a:solidFill>
+                  <a:schemeClr val="tx1"/>
+                </a:solidFill>
+              </a:rPr>
+              <a:t>ypetable.Register</a:t>
+            </a:r>
+            <a:r>
+              <a:rPr lang="it-IT" dirty="0" smtClean="0">
+                <a:solidFill>
+                  <a:schemeClr val="tx1"/>
+                </a:solidFill>
+              </a:rPr>
+              <a:t>()</a:t>
+            </a:r>
+            <a:endParaRPr lang="it-IT" dirty="0">
+              <a:solidFill>
+                <a:schemeClr val="tx1"/>
+              </a:solidFill>
+            </a:endParaRPr>
+          </a:p>
+        </p:txBody>
+      </p:sp>
+      <p:sp>
+        <p:nvSpPr>
+          <p:cNvPr id="23" name="Rettangolo 22"/>
+          <p:cNvSpPr/>
+          <p:nvPr/>
+        </p:nvSpPr>
+        <p:spPr>
+          <a:xfrm>
+            <a:off x="5116976" y="4760147"/>
+            <a:ext cx="1514331" cy="329696"/>
+          </a:xfrm>
+          <a:prstGeom prst="rect">
+            <a:avLst/>
+          </a:prstGeom>
+          <a:noFill/>
+          <a:ln>
+            <a:solidFill>
+              <a:schemeClr val="tx1"/>
+            </a:solidFill>
+          </a:ln>
+        </p:spPr>
+        <p:style>
+          <a:lnRef idx="1">
+            <a:schemeClr val="accent1"/>
+          </a:lnRef>
+          <a:fillRef idx="3">
+            <a:schemeClr val="accent1"/>
+          </a:fillRef>
+          <a:effectRef idx="2">
+            <a:schemeClr val="accent1"/>
+          </a:effectRef>
+          <a:fontRef idx="minor">
+            <a:schemeClr val="lt1"/>
+          </a:fontRef>
+        </p:style>
+        <p:txBody>
+          <a:bodyPr rtlCol="0" anchor="ctr"/>
+          <a:lstStyle/>
+          <a:p>
+            <a:pPr algn="ctr"/>
+            <a:r>
+              <a:rPr lang="it-IT" dirty="0" err="1" smtClean="0">
+                <a:solidFill>
+                  <a:schemeClr val="tx1"/>
+                </a:solidFill>
+              </a:rPr>
+              <a:t>trie.Insert</a:t>
+            </a:r>
+            <a:r>
+              <a:rPr lang="it-IT" dirty="0" smtClean="0">
+                <a:solidFill>
+                  <a:schemeClr val="tx1"/>
+                </a:solidFill>
+              </a:rPr>
+              <a:t>()</a:t>
+            </a:r>
+            <a:endParaRPr lang="it-IT" dirty="0">
+              <a:solidFill>
+                <a:schemeClr val="tx1"/>
+              </a:solidFill>
+            </a:endParaRPr>
+          </a:p>
+        </p:txBody>
+      </p:sp>
+      <p:cxnSp>
+        <p:nvCxnSpPr>
+          <p:cNvPr id="24" name="Connettore 2 23"/>
+          <p:cNvCxnSpPr>
+            <a:stCxn id="22" idx="2"/>
+            <a:endCxn id="23" idx="0"/>
+          </p:cNvCxnSpPr>
+          <p:nvPr/>
+        </p:nvCxnSpPr>
+        <p:spPr>
+          <a:xfrm>
+            <a:off x="5874142" y="3405201"/>
+            <a:ext cx="0" cy="1354946"/>
+          </a:xfrm>
+          <a:prstGeom prst="straightConnector1">
+            <a:avLst/>
+          </a:prstGeom>
+          <a:ln w="19050">
+            <a:solidFill>
+              <a:srgbClr val="000000"/>
+            </a:solidFill>
+            <a:tailEnd type="triangle" w="lg" len="lg"/>
+          </a:ln>
+        </p:spPr>
+        <p:style>
+          <a:lnRef idx="2">
+            <a:schemeClr val="accent1"/>
+          </a:lnRef>
+          <a:fillRef idx="0">
+            <a:schemeClr val="accent1"/>
+          </a:fillRef>
+          <a:effectRef idx="1">
+            <a:schemeClr val="accent1"/>
+          </a:effectRef>
+          <a:fontRef idx="minor">
+            <a:schemeClr val="tx1"/>
+          </a:fontRef>
+        </p:style>
+      </p:cxnSp>
+      <p:sp>
+        <p:nvSpPr>
+          <p:cNvPr id="17" name="Rettangolo 16"/>
+          <p:cNvSpPr/>
+          <p:nvPr/>
+        </p:nvSpPr>
+        <p:spPr>
+          <a:xfrm>
+            <a:off x="1569287" y="1568162"/>
+            <a:ext cx="2637869" cy="329696"/>
+          </a:xfrm>
+          <a:prstGeom prst="rect">
+            <a:avLst/>
+          </a:prstGeom>
+          <a:noFill/>
+          <a:ln>
+            <a:solidFill>
+              <a:schemeClr val="tx1"/>
+            </a:solidFill>
+          </a:ln>
+        </p:spPr>
+        <p:style>
+          <a:lnRef idx="1">
+            <a:schemeClr val="accent1"/>
+          </a:lnRef>
+          <a:fillRef idx="3">
+            <a:schemeClr val="accent1"/>
+          </a:fillRef>
+          <a:effectRef idx="2">
+            <a:schemeClr val="accent1"/>
+          </a:effectRef>
+          <a:fontRef idx="minor">
+            <a:schemeClr val="lt1"/>
+          </a:fontRef>
+        </p:style>
+        <p:txBody>
+          <a:bodyPr rtlCol="0" anchor="ctr"/>
+          <a:lstStyle/>
+          <a:p>
+            <a:pPr algn="ctr"/>
+            <a:r>
+              <a:rPr lang="it-IT" dirty="0" err="1" smtClean="0">
+                <a:solidFill>
+                  <a:schemeClr val="tx1"/>
+                </a:solidFill>
+              </a:rPr>
+              <a:t>typetable.HashForType</a:t>
+            </a:r>
+            <a:r>
+              <a:rPr lang="it-IT" dirty="0" smtClean="0">
+                <a:solidFill>
+                  <a:schemeClr val="tx1"/>
+                </a:solidFill>
+              </a:rPr>
+              <a:t>()</a:t>
+            </a:r>
+            <a:endParaRPr lang="it-IT" dirty="0">
+              <a:solidFill>
+                <a:schemeClr val="tx1"/>
+              </a:solidFill>
+            </a:endParaRPr>
+          </a:p>
+        </p:txBody>
+      </p:sp>
+    </p:spTree>
+    <p:extLst>
+      <p:ext uri="{BB962C8B-B14F-4D97-AF65-F5344CB8AC3E}">
+        <p14:creationId xmlns:p14="http://schemas.microsoft.com/office/powerpoint/2010/main" val="2565781118"/>
+      </p:ext>
+    </p:extLst>
+  </p:cSld>
+  <p:clrMapOvr>
+    <a:masterClrMapping/>
+  </p:clrMapOvr>
+</p:sld>
+</file>
+
+<file path=ppt/slides/slide4.xml><?xml version="1.0" encoding="utf-8"?>
+<p:sld xmlns:a="http://schemas.openxmlformats.org/drawingml/2006/main" xmlns:r="http://schemas.openxmlformats.org/officeDocument/2006/relationships" xmlns:p="http://schemas.openxmlformats.org/presentationml/2006/main">
+  <p:cSld>
+    <p:spTree>
+      <p:nvGrpSpPr>
+        <p:cNvPr id="1" name=""/>
+        <p:cNvGrpSpPr/>
+        <p:nvPr/>
+      </p:nvGrpSpPr>
+      <p:grpSpPr>
+        <a:xfrm>
+          <a:off x="0" y="0"/>
+          <a:ext cx="0" cy="0"/>
+          <a:chOff x="0" y="0"/>
+          <a:chExt cx="0" cy="0"/>
+        </a:xfrm>
+      </p:grpSpPr>
+      <p:sp>
+        <p:nvSpPr>
+          <p:cNvPr id="11" name="Rettangolo 10"/>
+          <p:cNvSpPr/>
+          <p:nvPr/>
+        </p:nvSpPr>
+        <p:spPr>
+          <a:xfrm>
+            <a:off x="415727" y="3978562"/>
+            <a:ext cx="1917340" cy="329696"/>
+          </a:xfrm>
+          <a:prstGeom prst="rect">
+            <a:avLst/>
+          </a:prstGeom>
+          <a:noFill/>
+          <a:ln>
+            <a:solidFill>
+              <a:schemeClr val="tx1"/>
+            </a:solidFill>
+          </a:ln>
+        </p:spPr>
+        <p:style>
+          <a:lnRef idx="1">
+            <a:schemeClr val="accent1"/>
+          </a:lnRef>
+          <a:fillRef idx="3">
+            <a:schemeClr val="accent1"/>
+          </a:fillRef>
+          <a:effectRef idx="2">
+            <a:schemeClr val="accent1"/>
+          </a:effectRef>
+          <a:fontRef idx="minor">
+            <a:schemeClr val="lt1"/>
+          </a:fontRef>
+        </p:style>
+        <p:txBody>
+          <a:bodyPr rtlCol="0" anchor="ctr"/>
+          <a:lstStyle/>
+          <a:p>
+            <a:pPr algn="ctr"/>
+            <a:r>
+              <a:rPr lang="it-IT" dirty="0" err="1" smtClean="0">
+                <a:solidFill>
+                  <a:schemeClr val="tx1"/>
+                </a:solidFill>
+              </a:rPr>
+              <a:t>callId.Increment</a:t>
+            </a:r>
+            <a:r>
+              <a:rPr lang="it-IT" dirty="0" smtClean="0">
+                <a:solidFill>
+                  <a:schemeClr val="tx1"/>
+                </a:solidFill>
+              </a:rPr>
+              <a:t>()</a:t>
+            </a:r>
+            <a:endParaRPr lang="it-IT" dirty="0">
+              <a:solidFill>
+                <a:schemeClr val="tx1"/>
+              </a:solidFill>
+            </a:endParaRPr>
+          </a:p>
+        </p:txBody>
+      </p:sp>
+      <p:sp>
+        <p:nvSpPr>
+          <p:cNvPr id="12" name="Rettangolo 11"/>
+          <p:cNvSpPr/>
+          <p:nvPr/>
+        </p:nvSpPr>
+        <p:spPr>
+          <a:xfrm>
+            <a:off x="5859131" y="266501"/>
+            <a:ext cx="1532904" cy="329696"/>
+          </a:xfrm>
+          <a:prstGeom prst="rect">
+            <a:avLst/>
+          </a:prstGeom>
+          <a:noFill/>
+          <a:ln>
+            <a:solidFill>
+              <a:schemeClr val="tx1"/>
+            </a:solidFill>
+          </a:ln>
+        </p:spPr>
+        <p:style>
+          <a:lnRef idx="1">
+            <a:schemeClr val="accent1"/>
+          </a:lnRef>
+          <a:fillRef idx="3">
+            <a:schemeClr val="accent1"/>
+          </a:fillRef>
+          <a:effectRef idx="2">
+            <a:schemeClr val="accent1"/>
+          </a:effectRef>
+          <a:fontRef idx="minor">
+            <a:schemeClr val="lt1"/>
+          </a:fontRef>
+        </p:style>
+        <p:txBody>
+          <a:bodyPr rtlCol="0" anchor="ctr"/>
+          <a:lstStyle/>
+          <a:p>
+            <a:pPr algn="ctr"/>
+            <a:r>
+              <a:rPr lang="it-IT" dirty="0" err="1" smtClean="0">
+                <a:solidFill>
+                  <a:schemeClr val="tx1"/>
+                </a:solidFill>
+              </a:rPr>
+              <a:t>NewClient</a:t>
+            </a:r>
+            <a:r>
+              <a:rPr lang="it-IT" dirty="0" smtClean="0">
+                <a:solidFill>
+                  <a:schemeClr val="tx1"/>
+                </a:solidFill>
+              </a:rPr>
+              <a:t>()</a:t>
+            </a:r>
+            <a:endParaRPr lang="it-IT" dirty="0">
+              <a:solidFill>
+                <a:schemeClr val="tx1"/>
+              </a:solidFill>
+            </a:endParaRPr>
+          </a:p>
+        </p:txBody>
+      </p:sp>
+      <p:sp>
+        <p:nvSpPr>
+          <p:cNvPr id="13" name="Rettangolo 12"/>
+          <p:cNvSpPr/>
+          <p:nvPr/>
+        </p:nvSpPr>
+        <p:spPr>
+          <a:xfrm>
+            <a:off x="1141851" y="266501"/>
+            <a:ext cx="1551477" cy="329696"/>
+          </a:xfrm>
+          <a:prstGeom prst="rect">
+            <a:avLst/>
+          </a:prstGeom>
+          <a:noFill/>
+          <a:ln>
+            <a:solidFill>
+              <a:schemeClr val="tx1"/>
+            </a:solidFill>
+          </a:ln>
+        </p:spPr>
+        <p:style>
+          <a:lnRef idx="1">
+            <a:schemeClr val="accent1"/>
+          </a:lnRef>
+          <a:fillRef idx="3">
+            <a:schemeClr val="accent1"/>
+          </a:fillRef>
+          <a:effectRef idx="2">
+            <a:schemeClr val="accent1"/>
+          </a:effectRef>
+          <a:fontRef idx="minor">
+            <a:schemeClr val="lt1"/>
+          </a:fontRef>
+        </p:style>
+        <p:txBody>
+          <a:bodyPr rtlCol="0" anchor="ctr"/>
+          <a:lstStyle/>
+          <a:p>
+            <a:pPr algn="ctr"/>
+            <a:r>
+              <a:rPr lang="it-IT" dirty="0" err="1" smtClean="0">
+                <a:solidFill>
+                  <a:schemeClr val="tx1"/>
+                </a:solidFill>
+              </a:rPr>
+              <a:t>NewServer</a:t>
+            </a:r>
+            <a:r>
+              <a:rPr lang="it-IT" dirty="0" smtClean="0">
+                <a:solidFill>
+                  <a:schemeClr val="tx1"/>
+                </a:solidFill>
+              </a:rPr>
+              <a:t>()</a:t>
+            </a:r>
+            <a:endParaRPr lang="it-IT" dirty="0">
+              <a:solidFill>
+                <a:schemeClr val="tx1"/>
+              </a:solidFill>
+            </a:endParaRPr>
+          </a:p>
+        </p:txBody>
+      </p:sp>
+      <p:sp>
+        <p:nvSpPr>
+          <p:cNvPr id="15" name="Rettangolo 14"/>
+          <p:cNvSpPr/>
+          <p:nvPr/>
+        </p:nvSpPr>
+        <p:spPr>
+          <a:xfrm>
+            <a:off x="5755072" y="2257128"/>
+            <a:ext cx="1917340" cy="329696"/>
+          </a:xfrm>
+          <a:prstGeom prst="rect">
+            <a:avLst/>
+          </a:prstGeom>
+          <a:noFill/>
+          <a:ln>
+            <a:solidFill>
+              <a:schemeClr val="tx1"/>
+            </a:solidFill>
+          </a:ln>
+        </p:spPr>
+        <p:style>
+          <a:lnRef idx="1">
+            <a:schemeClr val="accent1"/>
+          </a:lnRef>
+          <a:fillRef idx="3">
+            <a:schemeClr val="accent1"/>
+          </a:fillRef>
+          <a:effectRef idx="2">
+            <a:schemeClr val="accent1"/>
+          </a:effectRef>
+          <a:fontRef idx="minor">
+            <a:schemeClr val="lt1"/>
+          </a:fontRef>
+        </p:style>
+        <p:txBody>
+          <a:bodyPr rtlCol="0" anchor="ctr"/>
+          <a:lstStyle/>
+          <a:p>
+            <a:pPr algn="ctr"/>
+            <a:r>
+              <a:rPr lang="it-IT" dirty="0" err="1" smtClean="0">
+                <a:solidFill>
+                  <a:schemeClr val="tx1"/>
+                </a:solidFill>
+              </a:rPr>
+              <a:t>Client.Dispatch</a:t>
+            </a:r>
+            <a:r>
+              <a:rPr lang="it-IT" dirty="0" smtClean="0">
+                <a:solidFill>
+                  <a:schemeClr val="tx1"/>
+                </a:solidFill>
+              </a:rPr>
+              <a:t>()</a:t>
+            </a:r>
+            <a:endParaRPr lang="it-IT" dirty="0">
+              <a:solidFill>
+                <a:schemeClr val="tx1"/>
+              </a:solidFill>
+            </a:endParaRPr>
+          </a:p>
+        </p:txBody>
+      </p:sp>
+      <p:sp>
+        <p:nvSpPr>
+          <p:cNvPr id="17" name="Rettangolo 16"/>
+          <p:cNvSpPr/>
+          <p:nvPr/>
+        </p:nvSpPr>
+        <p:spPr>
+          <a:xfrm>
+            <a:off x="5764232" y="3978562"/>
+            <a:ext cx="1917340" cy="329696"/>
+          </a:xfrm>
+          <a:prstGeom prst="rect">
+            <a:avLst/>
+          </a:prstGeom>
+          <a:noFill/>
+          <a:ln>
+            <a:solidFill>
+              <a:schemeClr val="tx1"/>
+            </a:solidFill>
+          </a:ln>
+        </p:spPr>
+        <p:style>
+          <a:lnRef idx="1">
+            <a:schemeClr val="accent1"/>
+          </a:lnRef>
+          <a:fillRef idx="3">
+            <a:schemeClr val="accent1"/>
+          </a:fillRef>
+          <a:effectRef idx="2">
+            <a:schemeClr val="accent1"/>
+          </a:effectRef>
+          <a:fontRef idx="minor">
+            <a:schemeClr val="lt1"/>
+          </a:fontRef>
+        </p:style>
+        <p:txBody>
+          <a:bodyPr rtlCol="0" anchor="ctr"/>
+          <a:lstStyle/>
+          <a:p>
+            <a:pPr algn="ctr"/>
+            <a:r>
+              <a:rPr lang="it-IT" dirty="0" err="1" smtClean="0">
+                <a:solidFill>
+                  <a:schemeClr val="tx1"/>
+                </a:solidFill>
+              </a:rPr>
+              <a:t>Decoder.Decode</a:t>
+            </a:r>
+            <a:r>
+              <a:rPr lang="it-IT" dirty="0" smtClean="0">
+                <a:solidFill>
+                  <a:schemeClr val="tx1"/>
+                </a:solidFill>
+              </a:rPr>
+              <a:t>()</a:t>
+            </a:r>
+            <a:endParaRPr lang="it-IT" dirty="0">
+              <a:solidFill>
+                <a:schemeClr val="tx1"/>
+              </a:solidFill>
+            </a:endParaRPr>
+          </a:p>
+        </p:txBody>
+      </p:sp>
+      <p:cxnSp>
+        <p:nvCxnSpPr>
+          <p:cNvPr id="18" name="Connettore 2 17"/>
+          <p:cNvCxnSpPr>
+            <a:stCxn id="15" idx="2"/>
+            <a:endCxn id="17" idx="0"/>
+          </p:cNvCxnSpPr>
+          <p:nvPr/>
+        </p:nvCxnSpPr>
+        <p:spPr>
+          <a:xfrm>
+            <a:off x="6713742" y="2586824"/>
+            <a:ext cx="9160" cy="1391738"/>
+          </a:xfrm>
+          <a:prstGeom prst="straightConnector1">
+            <a:avLst/>
+          </a:prstGeom>
+          <a:ln w="19050">
+            <a:solidFill>
+              <a:srgbClr val="000000"/>
+            </a:solidFill>
+            <a:tailEnd type="triangle" w="lg" len="lg"/>
+          </a:ln>
+        </p:spPr>
+        <p:style>
+          <a:lnRef idx="2">
+            <a:schemeClr val="accent1"/>
+          </a:lnRef>
+          <a:fillRef idx="0">
+            <a:schemeClr val="accent1"/>
+          </a:fillRef>
+          <a:effectRef idx="1">
+            <a:schemeClr val="accent1"/>
+          </a:effectRef>
+          <a:fontRef idx="minor">
+            <a:schemeClr val="tx1"/>
+          </a:fontRef>
+        </p:style>
+      </p:cxnSp>
+      <p:sp>
+        <p:nvSpPr>
+          <p:cNvPr id="21" name="Rettangolo 20"/>
+          <p:cNvSpPr/>
+          <p:nvPr/>
+        </p:nvSpPr>
+        <p:spPr>
+          <a:xfrm>
+            <a:off x="1535957" y="2217484"/>
+            <a:ext cx="1917340" cy="329696"/>
+          </a:xfrm>
+          <a:prstGeom prst="rect">
+            <a:avLst/>
+          </a:prstGeom>
+          <a:noFill/>
+          <a:ln>
+            <a:solidFill>
+              <a:schemeClr val="tx1"/>
+            </a:solidFill>
+          </a:ln>
+        </p:spPr>
+        <p:style>
+          <a:lnRef idx="1">
+            <a:schemeClr val="accent1"/>
+          </a:lnRef>
+          <a:fillRef idx="3">
+            <a:schemeClr val="accent1"/>
+          </a:fillRef>
+          <a:effectRef idx="2">
+            <a:schemeClr val="accent1"/>
+          </a:effectRef>
+          <a:fontRef idx="minor">
+            <a:schemeClr val="lt1"/>
+          </a:fontRef>
+        </p:style>
+        <p:txBody>
+          <a:bodyPr rtlCol="0" anchor="ctr"/>
+          <a:lstStyle/>
+          <a:p>
+            <a:pPr algn="ctr"/>
+            <a:r>
+              <a:rPr lang="it-IT" dirty="0" err="1" smtClean="0">
+                <a:solidFill>
+                  <a:schemeClr val="tx1"/>
+                </a:solidFill>
+              </a:rPr>
+              <a:t>Client.Go</a:t>
+            </a:r>
+            <a:r>
+              <a:rPr lang="it-IT" dirty="0" smtClean="0">
+                <a:solidFill>
+                  <a:schemeClr val="tx1"/>
+                </a:solidFill>
+              </a:rPr>
+              <a:t>()</a:t>
+            </a:r>
+            <a:endParaRPr lang="it-IT" dirty="0">
+              <a:solidFill>
+                <a:schemeClr val="tx1"/>
+              </a:solidFill>
+            </a:endParaRPr>
+          </a:p>
+        </p:txBody>
+      </p:sp>
+      <p:cxnSp>
+        <p:nvCxnSpPr>
+          <p:cNvPr id="25" name="Connettore 2 24"/>
+          <p:cNvCxnSpPr>
+            <a:stCxn id="21" idx="2"/>
+            <a:endCxn id="11" idx="0"/>
+          </p:cNvCxnSpPr>
+          <p:nvPr/>
+        </p:nvCxnSpPr>
+        <p:spPr>
+          <a:xfrm flipH="1">
+            <a:off x="1374397" y="2547180"/>
+            <a:ext cx="1120230" cy="1431382"/>
+          </a:xfrm>
+          <a:prstGeom prst="straightConnector1">
+            <a:avLst/>
+          </a:prstGeom>
+          <a:ln w="19050">
+            <a:solidFill>
+              <a:srgbClr val="000000"/>
+            </a:solidFill>
+            <a:tailEnd type="triangle" w="lg" len="lg"/>
+          </a:ln>
+        </p:spPr>
+        <p:style>
+          <a:lnRef idx="2">
+            <a:schemeClr val="accent1"/>
+          </a:lnRef>
+          <a:fillRef idx="0">
+            <a:schemeClr val="accent1"/>
+          </a:fillRef>
+          <a:effectRef idx="1">
+            <a:schemeClr val="accent1"/>
+          </a:effectRef>
+          <a:fontRef idx="minor">
+            <a:schemeClr val="tx1"/>
+          </a:fontRef>
+        </p:style>
+      </p:cxnSp>
+      <p:sp>
+        <p:nvSpPr>
+          <p:cNvPr id="26" name="Rettangolo 25"/>
+          <p:cNvSpPr/>
+          <p:nvPr/>
+        </p:nvSpPr>
+        <p:spPr>
+          <a:xfrm>
+            <a:off x="2784924" y="3978562"/>
+            <a:ext cx="1917340" cy="329696"/>
+          </a:xfrm>
+          <a:prstGeom prst="rect">
+            <a:avLst/>
+          </a:prstGeom>
+          <a:noFill/>
+          <a:ln>
+            <a:solidFill>
+              <a:schemeClr val="tx1"/>
+            </a:solidFill>
+          </a:ln>
+        </p:spPr>
+        <p:style>
+          <a:lnRef idx="1">
+            <a:schemeClr val="accent1"/>
+          </a:lnRef>
+          <a:fillRef idx="3">
+            <a:schemeClr val="accent1"/>
+          </a:fillRef>
+          <a:effectRef idx="2">
+            <a:schemeClr val="accent1"/>
+          </a:effectRef>
+          <a:fontRef idx="minor">
+            <a:schemeClr val="lt1"/>
+          </a:fontRef>
+        </p:style>
+        <p:txBody>
+          <a:bodyPr rtlCol="0" anchor="ctr"/>
+          <a:lstStyle/>
+          <a:p>
+            <a:pPr algn="ctr"/>
+            <a:r>
+              <a:rPr lang="it-IT" dirty="0" err="1" smtClean="0">
+                <a:solidFill>
+                  <a:schemeClr val="tx1"/>
+                </a:solidFill>
+              </a:rPr>
+              <a:t>Encoder.Encode</a:t>
+            </a:r>
+            <a:r>
+              <a:rPr lang="it-IT" dirty="0" smtClean="0">
+                <a:solidFill>
+                  <a:schemeClr val="tx1"/>
+                </a:solidFill>
+              </a:rPr>
+              <a:t>()</a:t>
+            </a:r>
+            <a:endParaRPr lang="it-IT" dirty="0">
+              <a:solidFill>
+                <a:schemeClr val="tx1"/>
+              </a:solidFill>
+            </a:endParaRPr>
+          </a:p>
+        </p:txBody>
+      </p:sp>
+      <p:cxnSp>
+        <p:nvCxnSpPr>
+          <p:cNvPr id="27" name="Connettore 2 26"/>
+          <p:cNvCxnSpPr>
+            <a:stCxn id="21" idx="2"/>
+            <a:endCxn id="26" idx="0"/>
+          </p:cNvCxnSpPr>
+          <p:nvPr/>
+        </p:nvCxnSpPr>
+        <p:spPr>
+          <a:xfrm>
+            <a:off x="2494627" y="2547180"/>
+            <a:ext cx="1248967" cy="1431382"/>
+          </a:xfrm>
+          <a:prstGeom prst="straightConnector1">
+            <a:avLst/>
+          </a:prstGeom>
+          <a:ln w="19050">
+            <a:solidFill>
+              <a:srgbClr val="000000"/>
+            </a:solidFill>
+            <a:tailEnd type="triangle" w="lg" len="lg"/>
+          </a:ln>
+        </p:spPr>
+        <p:style>
+          <a:lnRef idx="2">
+            <a:schemeClr val="accent1"/>
+          </a:lnRef>
+          <a:fillRef idx="0">
+            <a:schemeClr val="accent1"/>
+          </a:fillRef>
+          <a:effectRef idx="1">
+            <a:schemeClr val="accent1"/>
+          </a:effectRef>
+          <a:fontRef idx="minor">
+            <a:schemeClr val="tx1"/>
+          </a:fontRef>
+        </p:style>
+      </p:cxnSp>
+      <p:sp>
+        <p:nvSpPr>
+          <p:cNvPr id="29" name="Rettangolo 28"/>
+          <p:cNvSpPr/>
+          <p:nvPr/>
+        </p:nvSpPr>
+        <p:spPr>
+          <a:xfrm>
+            <a:off x="3498837" y="862699"/>
+            <a:ext cx="1917340" cy="329696"/>
+          </a:xfrm>
+          <a:prstGeom prst="rect">
+            <a:avLst/>
+          </a:prstGeom>
+          <a:noFill/>
+          <a:ln>
+            <a:solidFill>
+              <a:schemeClr val="tx1"/>
+            </a:solidFill>
+          </a:ln>
+        </p:spPr>
+        <p:style>
+          <a:lnRef idx="1">
+            <a:schemeClr val="accent1"/>
+          </a:lnRef>
+          <a:fillRef idx="3">
+            <a:schemeClr val="accent1"/>
+          </a:fillRef>
+          <a:effectRef idx="2">
+            <a:schemeClr val="accent1"/>
+          </a:effectRef>
+          <a:fontRef idx="minor">
+            <a:schemeClr val="lt1"/>
+          </a:fontRef>
+        </p:style>
+        <p:txBody>
+          <a:bodyPr rtlCol="0" anchor="ctr"/>
+          <a:lstStyle/>
+          <a:p>
+            <a:pPr algn="ctr"/>
+            <a:r>
+              <a:rPr lang="it-IT" dirty="0" err="1" smtClean="0">
+                <a:solidFill>
+                  <a:schemeClr val="tx1"/>
+                </a:solidFill>
+              </a:rPr>
+              <a:t>Client.Call</a:t>
+            </a:r>
+            <a:r>
+              <a:rPr lang="it-IT" dirty="0" smtClean="0">
+                <a:solidFill>
+                  <a:schemeClr val="tx1"/>
+                </a:solidFill>
+              </a:rPr>
+              <a:t>()</a:t>
+            </a:r>
+            <a:endParaRPr lang="it-IT" dirty="0">
+              <a:solidFill>
+                <a:schemeClr val="tx1"/>
+              </a:solidFill>
+            </a:endParaRPr>
+          </a:p>
+        </p:txBody>
+      </p:sp>
+      <p:cxnSp>
+        <p:nvCxnSpPr>
+          <p:cNvPr id="30" name="Connettore 2 29"/>
+          <p:cNvCxnSpPr>
+            <a:stCxn id="29" idx="2"/>
+            <a:endCxn id="21" idx="0"/>
+          </p:cNvCxnSpPr>
+          <p:nvPr/>
+        </p:nvCxnSpPr>
+        <p:spPr>
+          <a:xfrm flipH="1">
+            <a:off x="2494627" y="1192395"/>
+            <a:ext cx="1962880" cy="1025089"/>
+          </a:xfrm>
+          <a:prstGeom prst="straightConnector1">
+            <a:avLst/>
+          </a:prstGeom>
+          <a:ln w="19050">
+            <a:solidFill>
+              <a:srgbClr val="000000"/>
+            </a:solidFill>
+            <a:tailEnd type="triangle" w="lg" len="lg"/>
+          </a:ln>
+        </p:spPr>
+        <p:style>
+          <a:lnRef idx="2">
+            <a:schemeClr val="accent1"/>
+          </a:lnRef>
+          <a:fillRef idx="0">
+            <a:schemeClr val="accent1"/>
+          </a:fillRef>
+          <a:effectRef idx="1">
+            <a:schemeClr val="accent1"/>
+          </a:effectRef>
+          <a:fontRef idx="minor">
+            <a:schemeClr val="tx1"/>
+          </a:fontRef>
+        </p:style>
+      </p:cxnSp>
+      <p:cxnSp>
+        <p:nvCxnSpPr>
+          <p:cNvPr id="33" name="Connettore 2 32"/>
+          <p:cNvCxnSpPr>
+            <a:stCxn id="29" idx="2"/>
+            <a:endCxn id="15" idx="0"/>
+          </p:cNvCxnSpPr>
+          <p:nvPr/>
+        </p:nvCxnSpPr>
+        <p:spPr>
+          <a:xfrm>
+            <a:off x="4457507" y="1192395"/>
+            <a:ext cx="2256235" cy="1064733"/>
+          </a:xfrm>
+          <a:prstGeom prst="straightConnector1">
+            <a:avLst/>
+          </a:prstGeom>
+          <a:ln w="19050">
+            <a:solidFill>
+              <a:srgbClr val="000000"/>
+            </a:solidFill>
+            <a:tailEnd type="triangle" w="lg" len="lg"/>
+          </a:ln>
+        </p:spPr>
+        <p:style>
+          <a:lnRef idx="2">
+            <a:schemeClr val="accent1"/>
+          </a:lnRef>
+          <a:fillRef idx="0">
+            <a:schemeClr val="accent1"/>
+          </a:fillRef>
+          <a:effectRef idx="1">
+            <a:schemeClr val="accent1"/>
+          </a:effectRef>
+          <a:fontRef idx="minor">
+            <a:schemeClr val="tx1"/>
+          </a:fontRef>
+        </p:style>
+      </p:cxnSp>
+      <p:sp>
+        <p:nvSpPr>
+          <p:cNvPr id="60" name="Rettangolo 59"/>
+          <p:cNvSpPr/>
+          <p:nvPr/>
+        </p:nvSpPr>
+        <p:spPr>
+          <a:xfrm>
+            <a:off x="3743084" y="4790437"/>
+            <a:ext cx="1673093" cy="329696"/>
+          </a:xfrm>
+          <a:prstGeom prst="rect">
+            <a:avLst/>
+          </a:prstGeom>
+          <a:noFill/>
+          <a:ln>
+            <a:solidFill>
+              <a:schemeClr val="tx1"/>
+            </a:solidFill>
+          </a:ln>
+        </p:spPr>
+        <p:style>
+          <a:lnRef idx="1">
+            <a:schemeClr val="accent1"/>
+          </a:lnRef>
+          <a:fillRef idx="3">
+            <a:schemeClr val="accent1"/>
+          </a:fillRef>
+          <a:effectRef idx="2">
+            <a:schemeClr val="accent1"/>
+          </a:effectRef>
+          <a:fontRef idx="minor">
+            <a:schemeClr val="lt1"/>
+          </a:fontRef>
+        </p:style>
+        <p:txBody>
+          <a:bodyPr rtlCol="0" anchor="ctr"/>
+          <a:lstStyle/>
+          <a:p>
+            <a:pPr algn="ctr"/>
+            <a:r>
+              <a:rPr lang="it-IT" dirty="0" err="1" smtClean="0">
+                <a:solidFill>
+                  <a:schemeClr val="tx1"/>
+                </a:solidFill>
+              </a:rPr>
+              <a:t>Server.Handle</a:t>
+            </a:r>
+            <a:r>
+              <a:rPr lang="it-IT" dirty="0" smtClean="0">
+                <a:solidFill>
+                  <a:schemeClr val="tx1"/>
+                </a:solidFill>
+              </a:rPr>
+              <a:t>()</a:t>
+            </a:r>
+            <a:endParaRPr lang="it-IT" dirty="0">
+              <a:solidFill>
+                <a:schemeClr val="tx1"/>
+              </a:solidFill>
+            </a:endParaRPr>
+          </a:p>
+        </p:txBody>
+      </p:sp>
+      <p:sp>
+        <p:nvSpPr>
+          <p:cNvPr id="61" name="Rettangolo 60"/>
+          <p:cNvSpPr/>
+          <p:nvPr/>
+        </p:nvSpPr>
+        <p:spPr>
+          <a:xfrm>
+            <a:off x="6600523" y="5942784"/>
+            <a:ext cx="1917340" cy="329696"/>
+          </a:xfrm>
+          <a:prstGeom prst="rect">
+            <a:avLst/>
+          </a:prstGeom>
+          <a:noFill/>
+          <a:ln>
+            <a:solidFill>
+              <a:schemeClr val="tx1"/>
+            </a:solidFill>
+          </a:ln>
+        </p:spPr>
+        <p:style>
+          <a:lnRef idx="1">
+            <a:schemeClr val="accent1"/>
+          </a:lnRef>
+          <a:fillRef idx="3">
+            <a:schemeClr val="accent1"/>
+          </a:fillRef>
+          <a:effectRef idx="2">
+            <a:schemeClr val="accent1"/>
+          </a:effectRef>
+          <a:fontRef idx="minor">
+            <a:schemeClr val="lt1"/>
+          </a:fontRef>
+        </p:style>
+        <p:txBody>
+          <a:bodyPr rtlCol="0" anchor="ctr"/>
+          <a:lstStyle/>
+          <a:p>
+            <a:pPr algn="ctr"/>
+            <a:r>
+              <a:rPr lang="it-IT" dirty="0" err="1" smtClean="0">
+                <a:solidFill>
+                  <a:schemeClr val="tx1"/>
+                </a:solidFill>
+              </a:rPr>
+              <a:t>Decoder.Decode</a:t>
+            </a:r>
+            <a:r>
+              <a:rPr lang="it-IT" dirty="0" smtClean="0">
+                <a:solidFill>
+                  <a:schemeClr val="tx1"/>
+                </a:solidFill>
+              </a:rPr>
+              <a:t>()</a:t>
+            </a:r>
+            <a:endParaRPr lang="it-IT" dirty="0">
+              <a:solidFill>
+                <a:schemeClr val="tx1"/>
+              </a:solidFill>
+            </a:endParaRPr>
+          </a:p>
+        </p:txBody>
+      </p:sp>
+      <p:sp>
+        <p:nvSpPr>
+          <p:cNvPr id="62" name="Rettangolo 61"/>
+          <p:cNvSpPr/>
+          <p:nvPr/>
+        </p:nvSpPr>
+        <p:spPr>
+          <a:xfrm>
+            <a:off x="3336773" y="5931522"/>
+            <a:ext cx="2497934" cy="329696"/>
+          </a:xfrm>
+          <a:prstGeom prst="rect">
+            <a:avLst/>
+          </a:prstGeom>
+          <a:noFill/>
+          <a:ln>
+            <a:solidFill>
+              <a:schemeClr val="tx1"/>
+            </a:solidFill>
+          </a:ln>
+        </p:spPr>
+        <p:style>
+          <a:lnRef idx="1">
+            <a:schemeClr val="accent1"/>
+          </a:lnRef>
+          <a:fillRef idx="3">
+            <a:schemeClr val="accent1"/>
+          </a:fillRef>
+          <a:effectRef idx="2">
+            <a:schemeClr val="accent1"/>
+          </a:effectRef>
+          <a:fontRef idx="minor">
+            <a:schemeClr val="lt1"/>
+          </a:fontRef>
+        </p:style>
+        <p:txBody>
+          <a:bodyPr rtlCol="0" anchor="ctr"/>
+          <a:lstStyle/>
+          <a:p>
+            <a:pPr algn="ctr"/>
+            <a:r>
+              <a:rPr lang="it-IT" dirty="0" err="1" smtClean="0">
+                <a:solidFill>
+                  <a:schemeClr val="tx1"/>
+                </a:solidFill>
+              </a:rPr>
+              <a:t>Decoder.DecodeValue</a:t>
+            </a:r>
+            <a:r>
+              <a:rPr lang="it-IT" dirty="0" smtClean="0">
+                <a:solidFill>
+                  <a:schemeClr val="tx1"/>
+                </a:solidFill>
+              </a:rPr>
+              <a:t>()</a:t>
+            </a:r>
+            <a:endParaRPr lang="it-IT" dirty="0">
+              <a:solidFill>
+                <a:schemeClr val="tx1"/>
+              </a:solidFill>
+            </a:endParaRPr>
+          </a:p>
+        </p:txBody>
+      </p:sp>
+      <p:sp>
+        <p:nvSpPr>
+          <p:cNvPr id="63" name="Rettangolo 62"/>
+          <p:cNvSpPr/>
+          <p:nvPr/>
+        </p:nvSpPr>
+        <p:spPr>
+          <a:xfrm>
+            <a:off x="286990" y="5942784"/>
+            <a:ext cx="2497934" cy="329696"/>
+          </a:xfrm>
+          <a:prstGeom prst="rect">
+            <a:avLst/>
+          </a:prstGeom>
+          <a:noFill/>
+          <a:ln>
+            <a:solidFill>
+              <a:schemeClr val="tx1"/>
+            </a:solidFill>
+          </a:ln>
+        </p:spPr>
+        <p:style>
+          <a:lnRef idx="1">
+            <a:schemeClr val="accent1"/>
+          </a:lnRef>
+          <a:fillRef idx="3">
+            <a:schemeClr val="accent1"/>
+          </a:fillRef>
+          <a:effectRef idx="2">
+            <a:schemeClr val="accent1"/>
+          </a:effectRef>
+          <a:fontRef idx="minor">
+            <a:schemeClr val="lt1"/>
+          </a:fontRef>
+        </p:style>
+        <p:txBody>
+          <a:bodyPr rtlCol="0" anchor="ctr"/>
+          <a:lstStyle/>
+          <a:p>
+            <a:pPr algn="ctr"/>
+            <a:r>
+              <a:rPr lang="it-IT" dirty="0" err="1" smtClean="0">
+                <a:solidFill>
+                  <a:schemeClr val="tx1"/>
+                </a:solidFill>
+              </a:rPr>
+              <a:t>Encoder.EncodeValue</a:t>
+            </a:r>
+            <a:r>
+              <a:rPr lang="it-IT" dirty="0" smtClean="0">
+                <a:solidFill>
+                  <a:schemeClr val="tx1"/>
+                </a:solidFill>
+              </a:rPr>
+              <a:t>()</a:t>
+            </a:r>
+            <a:endParaRPr lang="it-IT" dirty="0">
+              <a:solidFill>
+                <a:schemeClr val="tx1"/>
+              </a:solidFill>
+            </a:endParaRPr>
+          </a:p>
+        </p:txBody>
+      </p:sp>
+      <p:cxnSp>
+        <p:nvCxnSpPr>
+          <p:cNvPr id="64" name="Connettore 2 63"/>
+          <p:cNvCxnSpPr>
+            <a:stCxn id="60" idx="2"/>
+            <a:endCxn id="62" idx="0"/>
+          </p:cNvCxnSpPr>
+          <p:nvPr/>
+        </p:nvCxnSpPr>
+        <p:spPr>
+          <a:xfrm>
+            <a:off x="4579631" y="5120133"/>
+            <a:ext cx="6109" cy="811389"/>
+          </a:xfrm>
+          <a:prstGeom prst="straightConnector1">
+            <a:avLst/>
+          </a:prstGeom>
+          <a:ln w="19050">
+            <a:solidFill>
+              <a:srgbClr val="000000"/>
+            </a:solidFill>
+            <a:tailEnd type="triangle" w="lg" len="lg"/>
+          </a:ln>
+        </p:spPr>
+        <p:style>
+          <a:lnRef idx="2">
+            <a:schemeClr val="accent1"/>
+          </a:lnRef>
+          <a:fillRef idx="0">
+            <a:schemeClr val="accent1"/>
+          </a:fillRef>
+          <a:effectRef idx="1">
+            <a:schemeClr val="accent1"/>
+          </a:effectRef>
+          <a:fontRef idx="minor">
+            <a:schemeClr val="tx1"/>
+          </a:fontRef>
+        </p:style>
+      </p:cxnSp>
+      <p:cxnSp>
+        <p:nvCxnSpPr>
+          <p:cNvPr id="67" name="Connettore 2 66"/>
+          <p:cNvCxnSpPr>
+            <a:stCxn id="60" idx="2"/>
+            <a:endCxn id="61" idx="0"/>
+          </p:cNvCxnSpPr>
+          <p:nvPr/>
+        </p:nvCxnSpPr>
+        <p:spPr>
+          <a:xfrm>
+            <a:off x="4579631" y="5120133"/>
+            <a:ext cx="2979562" cy="822651"/>
+          </a:xfrm>
+          <a:prstGeom prst="straightConnector1">
+            <a:avLst/>
+          </a:prstGeom>
+          <a:ln w="19050">
+            <a:solidFill>
+              <a:srgbClr val="000000"/>
+            </a:solidFill>
+            <a:tailEnd type="triangle" w="lg" len="lg"/>
+          </a:ln>
+        </p:spPr>
+        <p:style>
+          <a:lnRef idx="2">
+            <a:schemeClr val="accent1"/>
+          </a:lnRef>
+          <a:fillRef idx="0">
+            <a:schemeClr val="accent1"/>
+          </a:fillRef>
+          <a:effectRef idx="1">
+            <a:schemeClr val="accent1"/>
+          </a:effectRef>
+          <a:fontRef idx="minor">
+            <a:schemeClr val="tx1"/>
+          </a:fontRef>
+        </p:style>
+      </p:cxnSp>
+      <p:cxnSp>
+        <p:nvCxnSpPr>
+          <p:cNvPr id="70" name="Connettore 2 69"/>
+          <p:cNvCxnSpPr>
+            <a:stCxn id="60" idx="2"/>
+            <a:endCxn id="63" idx="0"/>
+          </p:cNvCxnSpPr>
+          <p:nvPr/>
+        </p:nvCxnSpPr>
+        <p:spPr>
+          <a:xfrm flipH="1">
+            <a:off x="1535957" y="5120133"/>
+            <a:ext cx="3043674" cy="822651"/>
+          </a:xfrm>
+          <a:prstGeom prst="straightConnector1">
+            <a:avLst/>
+          </a:prstGeom>
+          <a:ln w="19050">
+            <a:solidFill>
+              <a:srgbClr val="000000"/>
+            </a:solidFill>
+            <a:tailEnd type="triangle" w="lg" len="lg"/>
+          </a:ln>
+        </p:spPr>
+        <p:style>
+          <a:lnRef idx="2">
+            <a:schemeClr val="accent1"/>
+          </a:lnRef>
+          <a:fillRef idx="0">
+            <a:schemeClr val="accent1"/>
+          </a:fillRef>
+          <a:effectRef idx="1">
+            <a:schemeClr val="accent1"/>
+          </a:effectRef>
+          <a:fontRef idx="minor">
+            <a:schemeClr val="tx1"/>
+          </a:fontRef>
+        </p:style>
+      </p:cxnSp>
+    </p:spTree>
+    <p:extLst>
+      <p:ext uri="{BB962C8B-B14F-4D97-AF65-F5344CB8AC3E}">
+        <p14:creationId xmlns:p14="http://schemas.microsoft.com/office/powerpoint/2010/main" val="3212236336"/>
       </p:ext>
     </p:extLst>
   </p:cSld>

</xml_diff>